<commit_message>
updated copy on some of the output messages
</commit_message>
<xml_diff>
--- a/technical_docs/errorx_figures.pptx
+++ b/technical_docs/errorx_figures.pptx
@@ -12,6 +12,9 @@
     <p:sldId id="263" r:id="rId6"/>
     <p:sldId id="261" r:id="rId7"/>
     <p:sldId id="262" r:id="rId8"/>
+    <p:sldId id="266" r:id="rId9"/>
+    <p:sldId id="267" r:id="rId10"/>
+    <p:sldId id="268" r:id="rId11"/>
   </p:sldIdLst>
   <p:sldSz cx="12192000" cy="6858000"/>
   <p:notesSz cx="6858000" cy="9144000"/>
@@ -265,7 +268,7 @@
           <a:p>
             <a:fld id="{54DD2D54-7904-124C-B83E-BECE2B1DF572}" type="datetimeFigureOut">
               <a:rPr lang="en-US" smtClean="0"/>
-              <a:t>2/1/19</a:t>
+              <a:t>2/3/19</a:t>
             </a:fld>
             <a:endParaRPr lang="en-US"/>
           </a:p>
@@ -463,7 +466,7 @@
           <a:p>
             <a:fld id="{54DD2D54-7904-124C-B83E-BECE2B1DF572}" type="datetimeFigureOut">
               <a:rPr lang="en-US" smtClean="0"/>
-              <a:t>2/1/19</a:t>
+              <a:t>2/3/19</a:t>
             </a:fld>
             <a:endParaRPr lang="en-US"/>
           </a:p>
@@ -671,7 +674,7 @@
           <a:p>
             <a:fld id="{54DD2D54-7904-124C-B83E-BECE2B1DF572}" type="datetimeFigureOut">
               <a:rPr lang="en-US" smtClean="0"/>
-              <a:t>2/1/19</a:t>
+              <a:t>2/3/19</a:t>
             </a:fld>
             <a:endParaRPr lang="en-US"/>
           </a:p>
@@ -869,7 +872,7 @@
           <a:p>
             <a:fld id="{54DD2D54-7904-124C-B83E-BECE2B1DF572}" type="datetimeFigureOut">
               <a:rPr lang="en-US" smtClean="0"/>
-              <a:t>2/1/19</a:t>
+              <a:t>2/3/19</a:t>
             </a:fld>
             <a:endParaRPr lang="en-US"/>
           </a:p>
@@ -1144,7 +1147,7 @@
           <a:p>
             <a:fld id="{54DD2D54-7904-124C-B83E-BECE2B1DF572}" type="datetimeFigureOut">
               <a:rPr lang="en-US" smtClean="0"/>
-              <a:t>2/1/19</a:t>
+              <a:t>2/3/19</a:t>
             </a:fld>
             <a:endParaRPr lang="en-US"/>
           </a:p>
@@ -1409,7 +1412,7 @@
           <a:p>
             <a:fld id="{54DD2D54-7904-124C-B83E-BECE2B1DF572}" type="datetimeFigureOut">
               <a:rPr lang="en-US" smtClean="0"/>
-              <a:t>2/1/19</a:t>
+              <a:t>2/3/19</a:t>
             </a:fld>
             <a:endParaRPr lang="en-US"/>
           </a:p>
@@ -1821,7 +1824,7 @@
           <a:p>
             <a:fld id="{54DD2D54-7904-124C-B83E-BECE2B1DF572}" type="datetimeFigureOut">
               <a:rPr lang="en-US" smtClean="0"/>
-              <a:t>2/1/19</a:t>
+              <a:t>2/3/19</a:t>
             </a:fld>
             <a:endParaRPr lang="en-US"/>
           </a:p>
@@ -1962,7 +1965,7 @@
           <a:p>
             <a:fld id="{54DD2D54-7904-124C-B83E-BECE2B1DF572}" type="datetimeFigureOut">
               <a:rPr lang="en-US" smtClean="0"/>
-              <a:t>2/1/19</a:t>
+              <a:t>2/3/19</a:t>
             </a:fld>
             <a:endParaRPr lang="en-US"/>
           </a:p>
@@ -2075,7 +2078,7 @@
           <a:p>
             <a:fld id="{54DD2D54-7904-124C-B83E-BECE2B1DF572}" type="datetimeFigureOut">
               <a:rPr lang="en-US" smtClean="0"/>
-              <a:t>2/1/19</a:t>
+              <a:t>2/3/19</a:t>
             </a:fld>
             <a:endParaRPr lang="en-US"/>
           </a:p>
@@ -2386,7 +2389,7 @@
           <a:p>
             <a:fld id="{54DD2D54-7904-124C-B83E-BECE2B1DF572}" type="datetimeFigureOut">
               <a:rPr lang="en-US" smtClean="0"/>
-              <a:t>2/1/19</a:t>
+              <a:t>2/3/19</a:t>
             </a:fld>
             <a:endParaRPr lang="en-US"/>
           </a:p>
@@ -2674,7 +2677,7 @@
           <a:p>
             <a:fld id="{54DD2D54-7904-124C-B83E-BECE2B1DF572}" type="datetimeFigureOut">
               <a:rPr lang="en-US" smtClean="0"/>
-              <a:t>2/1/19</a:t>
+              <a:t>2/3/19</a:t>
             </a:fld>
             <a:endParaRPr lang="en-US"/>
           </a:p>
@@ -2915,7 +2918,7 @@
           <a:p>
             <a:fld id="{54DD2D54-7904-124C-B83E-BECE2B1DF572}" type="datetimeFigureOut">
               <a:rPr lang="en-US" smtClean="0"/>
-              <a:t>2/1/19</a:t>
+              <a:t>2/3/19</a:t>
             </a:fld>
             <a:endParaRPr lang="en-US"/>
           </a:p>
@@ -3984,6 +3987,76 @@
 </p:sld>
 </file>
 
+<file path=ppt/slides/slide10.xml><?xml version="1.0" encoding="utf-8"?>
+<p:sld xmlns:a="http://schemas.openxmlformats.org/drawingml/2006/main" xmlns:r="http://schemas.openxmlformats.org/officeDocument/2006/relationships" xmlns:p="http://schemas.openxmlformats.org/presentationml/2006/main">
+  <p:cSld>
+    <p:spTree>
+      <p:nvGrpSpPr>
+        <p:cNvPr id="1" name=""/>
+        <p:cNvGrpSpPr/>
+        <p:nvPr/>
+      </p:nvGrpSpPr>
+      <p:grpSpPr>
+        <a:xfrm>
+          <a:off x="0" y="0"/>
+          <a:ext cx="0" cy="0"/>
+          <a:chOff x="0" y="0"/>
+          <a:chExt cx="0" cy="0"/>
+        </a:xfrm>
+      </p:grpSpPr>
+      <p:pic>
+        <p:nvPicPr>
+          <p:cNvPr id="4" name="Picture 3">
+            <a:extLst>
+              <a:ext uri="{FF2B5EF4-FFF2-40B4-BE49-F238E27FC236}">
+                <a16:creationId xmlns:a16="http://schemas.microsoft.com/office/drawing/2014/main" id="{68F7E5FC-5043-3C46-8E72-92A0935599F6}"/>
+              </a:ext>
+            </a:extLst>
+          </p:cNvPr>
+          <p:cNvPicPr>
+            <a:picLocks noChangeAspect="1"/>
+          </p:cNvPicPr>
+          <p:nvPr/>
+        </p:nvPicPr>
+        <p:blipFill rotWithShape="1">
+          <a:blip r:embed="rId2">
+            <a:clrChange>
+              <a:clrFrom>
+                <a:srgbClr val="FFFFFF"/>
+              </a:clrFrom>
+              <a:clrTo>
+                <a:srgbClr val="FFFFFF">
+                  <a:alpha val="0"/>
+                </a:srgbClr>
+              </a:clrTo>
+            </a:clrChange>
+          </a:blip>
+          <a:srcRect l="16327" t="33115" r="57583" b="31693"/>
+          <a:stretch/>
+        </p:blipFill>
+        <p:spPr>
+          <a:xfrm>
+            <a:off x="168812" y="1439945"/>
+            <a:ext cx="3812346" cy="3990184"/>
+          </a:xfrm>
+          <a:prstGeom prst="rect">
+            <a:avLst/>
+          </a:prstGeom>
+        </p:spPr>
+      </p:pic>
+    </p:spTree>
+    <p:extLst>
+      <p:ext uri="{BB962C8B-B14F-4D97-AF65-F5344CB8AC3E}">
+        <p14:creationId xmlns:p14="http://schemas.microsoft.com/office/powerpoint/2010/main" val="2785002276"/>
+      </p:ext>
+    </p:extLst>
+  </p:cSld>
+  <p:clrMapOvr>
+    <a:masterClrMapping/>
+  </p:clrMapOvr>
+</p:sld>
+</file>
+
 <file path=ppt/slides/slide2.xml><?xml version="1.0" encoding="utf-8"?>
 <p:sld xmlns:a="http://schemas.openxmlformats.org/drawingml/2006/main" xmlns:r="http://schemas.openxmlformats.org/officeDocument/2006/relationships" xmlns:p="http://schemas.openxmlformats.org/presentationml/2006/main">
   <p:cSld>
@@ -4541,7 +4614,7 @@
         </p:blipFill>
         <p:spPr>
           <a:xfrm>
-            <a:off x="379829" y="5076614"/>
+            <a:off x="3913340" y="5185711"/>
             <a:ext cx="3900074" cy="1255465"/>
           </a:xfrm>
           <a:prstGeom prst="rect">
@@ -7534,6 +7607,145 @@
     <p:extLst>
       <p:ext uri="{BB962C8B-B14F-4D97-AF65-F5344CB8AC3E}">
         <p14:creationId xmlns:p14="http://schemas.microsoft.com/office/powerpoint/2010/main" val="1128338536"/>
+      </p:ext>
+    </p:extLst>
+  </p:cSld>
+  <p:clrMapOvr>
+    <a:masterClrMapping/>
+  </p:clrMapOvr>
+</p:sld>
+</file>
+
+<file path=ppt/slides/slide8.xml><?xml version="1.0" encoding="utf-8"?>
+<p:sld xmlns:a="http://schemas.openxmlformats.org/drawingml/2006/main" xmlns:r="http://schemas.openxmlformats.org/officeDocument/2006/relationships" xmlns:p="http://schemas.openxmlformats.org/presentationml/2006/main">
+  <p:cSld>
+    <p:spTree>
+      <p:nvGrpSpPr>
+        <p:cNvPr id="1" name=""/>
+        <p:cNvGrpSpPr/>
+        <p:nvPr/>
+      </p:nvGrpSpPr>
+      <p:grpSpPr>
+        <a:xfrm>
+          <a:off x="0" y="0"/>
+          <a:ext cx="0" cy="0"/>
+          <a:chOff x="0" y="0"/>
+          <a:chExt cx="0" cy="0"/>
+        </a:xfrm>
+      </p:grpSpPr>
+      <p:pic>
+        <p:nvPicPr>
+          <p:cNvPr id="5" name="Content Placeholder 4">
+            <a:extLst>
+              <a:ext uri="{FF2B5EF4-FFF2-40B4-BE49-F238E27FC236}">
+                <a16:creationId xmlns:a16="http://schemas.microsoft.com/office/drawing/2014/main" id="{FD7AF0A6-6E84-0E48-B640-B03E9D6216E8}"/>
+              </a:ext>
+            </a:extLst>
+          </p:cNvPr>
+          <p:cNvPicPr>
+            <a:picLocks noGrp="1" noChangeAspect="1"/>
+          </p:cNvPicPr>
+          <p:nvPr>
+            <p:ph idx="1"/>
+          </p:nvPr>
+        </p:nvPicPr>
+        <p:blipFill rotWithShape="1">
+          <a:blip r:embed="rId2">
+            <a:clrChange>
+              <a:clrFrom>
+                <a:srgbClr val="FFFFFF"/>
+              </a:clrFrom>
+              <a:clrTo>
+                <a:srgbClr val="FFFFFF">
+                  <a:alpha val="0"/>
+                </a:srgbClr>
+              </a:clrTo>
+            </a:clrChange>
+          </a:blip>
+          <a:srcRect b="8341"/>
+          <a:stretch/>
+        </p:blipFill>
+        <p:spPr>
+          <a:xfrm>
+            <a:off x="602077" y="1892606"/>
+            <a:ext cx="2603500" cy="2060416"/>
+          </a:xfrm>
+        </p:spPr>
+      </p:pic>
+    </p:spTree>
+    <p:extLst>
+      <p:ext uri="{BB962C8B-B14F-4D97-AF65-F5344CB8AC3E}">
+        <p14:creationId xmlns:p14="http://schemas.microsoft.com/office/powerpoint/2010/main" val="1113475261"/>
+      </p:ext>
+    </p:extLst>
+  </p:cSld>
+  <p:clrMapOvr>
+    <a:masterClrMapping/>
+  </p:clrMapOvr>
+</p:sld>
+</file>
+
+<file path=ppt/slides/slide9.xml><?xml version="1.0" encoding="utf-8"?>
+<p:sld xmlns:a="http://schemas.openxmlformats.org/drawingml/2006/main" xmlns:r="http://schemas.openxmlformats.org/officeDocument/2006/relationships" xmlns:p="http://schemas.openxmlformats.org/presentationml/2006/main">
+  <p:cSld>
+    <p:spTree>
+      <p:nvGrpSpPr>
+        <p:cNvPr id="1" name=""/>
+        <p:cNvGrpSpPr/>
+        <p:nvPr/>
+      </p:nvGrpSpPr>
+      <p:grpSpPr>
+        <a:xfrm>
+          <a:off x="0" y="0"/>
+          <a:ext cx="0" cy="0"/>
+          <a:chOff x="0" y="0"/>
+          <a:chExt cx="0" cy="0"/>
+        </a:xfrm>
+      </p:grpSpPr>
+      <p:pic>
+        <p:nvPicPr>
+          <p:cNvPr id="4" name="Picture 3">
+            <a:extLst>
+              <a:ext uri="{FF2B5EF4-FFF2-40B4-BE49-F238E27FC236}">
+                <a16:creationId xmlns:a16="http://schemas.microsoft.com/office/drawing/2014/main" id="{68F7E5FC-5043-3C46-8E72-92A0935599F6}"/>
+              </a:ext>
+            </a:extLst>
+          </p:cNvPr>
+          <p:cNvPicPr>
+            <a:picLocks noChangeAspect="1"/>
+          </p:cNvPicPr>
+          <p:nvPr/>
+        </p:nvPicPr>
+        <p:blipFill rotWithShape="1">
+          <a:blip r:embed="rId2">
+            <a:clrChange>
+              <a:clrFrom>
+                <a:srgbClr val="FFFFFF"/>
+              </a:clrFrom>
+              <a:clrTo>
+                <a:srgbClr val="FFFFFF">
+                  <a:alpha val="0"/>
+                </a:srgbClr>
+              </a:clrTo>
+            </a:clrChange>
+          </a:blip>
+          <a:srcRect l="15172" t="33115" b="31693"/>
+          <a:stretch/>
+        </p:blipFill>
+        <p:spPr>
+          <a:xfrm>
+            <a:off x="-1" y="1439945"/>
+            <a:ext cx="12395417" cy="3990184"/>
+          </a:xfrm>
+          <a:prstGeom prst="rect">
+            <a:avLst/>
+          </a:prstGeom>
+        </p:spPr>
+      </p:pic>
+    </p:spTree>
+    <p:extLst>
+      <p:ext uri="{BB962C8B-B14F-4D97-AF65-F5344CB8AC3E}">
+        <p14:creationId xmlns:p14="http://schemas.microsoft.com/office/powerpoint/2010/main" val="1475532212"/>
       </p:ext>
     </p:extLst>
   </p:cSld>

</xml_diff>

<commit_message>
fixed bug causing the testing binary to run twice
</commit_message>
<xml_diff>
--- a/technical_docs/errorx_figures.pptx
+++ b/technical_docs/errorx_figures.pptx
@@ -5,7 +5,7 @@
     <p:sldMasterId id="2147483648" r:id="rId1"/>
   </p:sldMasterIdLst>
   <p:notesMasterIdLst>
-    <p:notesMasterId r:id="rId16"/>
+    <p:notesMasterId r:id="rId17"/>
   </p:notesMasterIdLst>
   <p:sldIdLst>
     <p:sldId id="256" r:id="rId2"/>
@@ -19,9 +19,10 @@
     <p:sldId id="262" r:id="rId10"/>
     <p:sldId id="270" r:id="rId11"/>
     <p:sldId id="273" r:id="rId12"/>
-    <p:sldId id="266" r:id="rId13"/>
-    <p:sldId id="267" r:id="rId14"/>
-    <p:sldId id="268" r:id="rId15"/>
+    <p:sldId id="274" r:id="rId13"/>
+    <p:sldId id="266" r:id="rId14"/>
+    <p:sldId id="267" r:id="rId15"/>
+    <p:sldId id="268" r:id="rId16"/>
   </p:sldIdLst>
   <p:sldSz cx="12192000" cy="6858000"/>
   <p:notesSz cx="6858000" cy="9144000"/>
@@ -210,7 +211,7 @@
           <a:p>
             <a:fld id="{9AAD2984-BD08-5446-A0E1-FDAFD2895310}" type="datetimeFigureOut">
               <a:rPr lang="en-US" smtClean="0"/>
-              <a:t>2/7/19</a:t>
+              <a:t>2/10/19</a:t>
             </a:fld>
             <a:endParaRPr lang="en-US"/>
           </a:p>
@@ -645,6 +646,90 @@
 </p:notes>
 </file>
 
+<file path=ppt/notesSlides/notesSlide3.xml><?xml version="1.0" encoding="utf-8"?>
+<p:notes xmlns:a="http://schemas.openxmlformats.org/drawingml/2006/main" xmlns:r="http://schemas.openxmlformats.org/officeDocument/2006/relationships" xmlns:p="http://schemas.openxmlformats.org/presentationml/2006/main">
+  <p:cSld>
+    <p:spTree>
+      <p:nvGrpSpPr>
+        <p:cNvPr id="1" name=""/>
+        <p:cNvGrpSpPr/>
+        <p:nvPr/>
+      </p:nvGrpSpPr>
+      <p:grpSpPr>
+        <a:xfrm>
+          <a:off x="0" y="0"/>
+          <a:ext cx="0" cy="0"/>
+          <a:chOff x="0" y="0"/>
+          <a:chExt cx="0" cy="0"/>
+        </a:xfrm>
+      </p:grpSpPr>
+      <p:sp>
+        <p:nvSpPr>
+          <p:cNvPr id="2" name="Slide Image Placeholder 1"/>
+          <p:cNvSpPr>
+            <a:spLocks noGrp="1" noRot="1" noChangeAspect="1"/>
+          </p:cNvSpPr>
+          <p:nvPr>
+            <p:ph type="sldImg"/>
+          </p:nvPr>
+        </p:nvSpPr>
+        <p:spPr/>
+      </p:sp>
+      <p:sp>
+        <p:nvSpPr>
+          <p:cNvPr id="3" name="Notes Placeholder 2"/>
+          <p:cNvSpPr>
+            <a:spLocks noGrp="1"/>
+          </p:cNvSpPr>
+          <p:nvPr>
+            <p:ph type="body" idx="1"/>
+          </p:nvPr>
+        </p:nvSpPr>
+        <p:spPr/>
+        <p:txBody>
+          <a:bodyPr/>
+          <a:lstStyle/>
+          <a:p>
+            <a:endParaRPr lang="en-US" dirty="0"/>
+          </a:p>
+        </p:txBody>
+      </p:sp>
+      <p:sp>
+        <p:nvSpPr>
+          <p:cNvPr id="4" name="Slide Number Placeholder 3"/>
+          <p:cNvSpPr>
+            <a:spLocks noGrp="1"/>
+          </p:cNvSpPr>
+          <p:nvPr>
+            <p:ph type="sldNum" sz="quarter" idx="5"/>
+          </p:nvPr>
+        </p:nvSpPr>
+        <p:spPr/>
+        <p:txBody>
+          <a:bodyPr/>
+          <a:lstStyle/>
+          <a:p>
+            <a:fld id="{6C8B5219-3352-E142-9C16-137A3314233C}" type="slidenum">
+              <a:rPr lang="en-US" smtClean="0"/>
+              <a:t>12</a:t>
+            </a:fld>
+            <a:endParaRPr lang="en-US"/>
+          </a:p>
+        </p:txBody>
+      </p:sp>
+    </p:spTree>
+    <p:extLst>
+      <p:ext uri="{BB962C8B-B14F-4D97-AF65-F5344CB8AC3E}">
+        <p14:creationId xmlns:p14="http://schemas.microsoft.com/office/powerpoint/2010/main" val="2441595307"/>
+      </p:ext>
+    </p:extLst>
+  </p:cSld>
+  <p:clrMapOvr>
+    <a:masterClrMapping/>
+  </p:clrMapOvr>
+</p:notes>
+</file>
+
 <file path=ppt/slideLayouts/slideLayout1.xml><?xml version="1.0" encoding="utf-8"?>
 <p:sldLayout xmlns:a="http://schemas.openxmlformats.org/drawingml/2006/main" xmlns:r="http://schemas.openxmlformats.org/officeDocument/2006/relationships" xmlns:p="http://schemas.openxmlformats.org/presentationml/2006/main" type="title" preserve="1">
   <p:cSld name="Title Slide">
@@ -792,7 +877,7 @@
           <a:p>
             <a:fld id="{54DD2D54-7904-124C-B83E-BECE2B1DF572}" type="datetimeFigureOut">
               <a:rPr lang="en-US" smtClean="0"/>
-              <a:t>2/7/19</a:t>
+              <a:t>2/10/19</a:t>
             </a:fld>
             <a:endParaRPr lang="en-US"/>
           </a:p>
@@ -990,7 +1075,7 @@
           <a:p>
             <a:fld id="{54DD2D54-7904-124C-B83E-BECE2B1DF572}" type="datetimeFigureOut">
               <a:rPr lang="en-US" smtClean="0"/>
-              <a:t>2/7/19</a:t>
+              <a:t>2/10/19</a:t>
             </a:fld>
             <a:endParaRPr lang="en-US"/>
           </a:p>
@@ -1198,7 +1283,7 @@
           <a:p>
             <a:fld id="{54DD2D54-7904-124C-B83E-BECE2B1DF572}" type="datetimeFigureOut">
               <a:rPr lang="en-US" smtClean="0"/>
-              <a:t>2/7/19</a:t>
+              <a:t>2/10/19</a:t>
             </a:fld>
             <a:endParaRPr lang="en-US"/>
           </a:p>
@@ -1396,7 +1481,7 @@
           <a:p>
             <a:fld id="{54DD2D54-7904-124C-B83E-BECE2B1DF572}" type="datetimeFigureOut">
               <a:rPr lang="en-US" smtClean="0"/>
-              <a:t>2/7/19</a:t>
+              <a:t>2/10/19</a:t>
             </a:fld>
             <a:endParaRPr lang="en-US"/>
           </a:p>
@@ -1671,7 +1756,7 @@
           <a:p>
             <a:fld id="{54DD2D54-7904-124C-B83E-BECE2B1DF572}" type="datetimeFigureOut">
               <a:rPr lang="en-US" smtClean="0"/>
-              <a:t>2/7/19</a:t>
+              <a:t>2/10/19</a:t>
             </a:fld>
             <a:endParaRPr lang="en-US"/>
           </a:p>
@@ -1936,7 +2021,7 @@
           <a:p>
             <a:fld id="{54DD2D54-7904-124C-B83E-BECE2B1DF572}" type="datetimeFigureOut">
               <a:rPr lang="en-US" smtClean="0"/>
-              <a:t>2/7/19</a:t>
+              <a:t>2/10/19</a:t>
             </a:fld>
             <a:endParaRPr lang="en-US"/>
           </a:p>
@@ -2348,7 +2433,7 @@
           <a:p>
             <a:fld id="{54DD2D54-7904-124C-B83E-BECE2B1DF572}" type="datetimeFigureOut">
               <a:rPr lang="en-US" smtClean="0"/>
-              <a:t>2/7/19</a:t>
+              <a:t>2/10/19</a:t>
             </a:fld>
             <a:endParaRPr lang="en-US"/>
           </a:p>
@@ -2489,7 +2574,7 @@
           <a:p>
             <a:fld id="{54DD2D54-7904-124C-B83E-BECE2B1DF572}" type="datetimeFigureOut">
               <a:rPr lang="en-US" smtClean="0"/>
-              <a:t>2/7/19</a:t>
+              <a:t>2/10/19</a:t>
             </a:fld>
             <a:endParaRPr lang="en-US"/>
           </a:p>
@@ -2602,7 +2687,7 @@
           <a:p>
             <a:fld id="{54DD2D54-7904-124C-B83E-BECE2B1DF572}" type="datetimeFigureOut">
               <a:rPr lang="en-US" smtClean="0"/>
-              <a:t>2/7/19</a:t>
+              <a:t>2/10/19</a:t>
             </a:fld>
             <a:endParaRPr lang="en-US"/>
           </a:p>
@@ -2913,7 +2998,7 @@
           <a:p>
             <a:fld id="{54DD2D54-7904-124C-B83E-BECE2B1DF572}" type="datetimeFigureOut">
               <a:rPr lang="en-US" smtClean="0"/>
-              <a:t>2/7/19</a:t>
+              <a:t>2/10/19</a:t>
             </a:fld>
             <a:endParaRPr lang="en-US"/>
           </a:p>
@@ -3201,7 +3286,7 @@
           <a:p>
             <a:fld id="{54DD2D54-7904-124C-B83E-BECE2B1DF572}" type="datetimeFigureOut">
               <a:rPr lang="en-US" smtClean="0"/>
-              <a:t>2/7/19</a:t>
+              <a:t>2/10/19</a:t>
             </a:fld>
             <a:endParaRPr lang="en-US"/>
           </a:p>
@@ -3442,7 +3527,7 @@
           <a:p>
             <a:fld id="{54DD2D54-7904-124C-B83E-BECE2B1DF572}" type="datetimeFigureOut">
               <a:rPr lang="en-US" smtClean="0"/>
-              <a:t>2/7/19</a:t>
+              <a:t>2/10/19</a:t>
             </a:fld>
             <a:endParaRPr lang="en-US"/>
           </a:p>
@@ -5014,6 +5099,43 @@
           </a:prstGeom>
         </p:spPr>
       </p:pic>
+      <p:sp>
+        <p:nvSpPr>
+          <p:cNvPr id="4" name="TextBox 3">
+            <a:extLst>
+              <a:ext uri="{FF2B5EF4-FFF2-40B4-BE49-F238E27FC236}">
+                <a16:creationId xmlns:a16="http://schemas.microsoft.com/office/drawing/2014/main" id="{458986AC-796A-2E4D-B7E0-5AE1C0423FFC}"/>
+              </a:ext>
+            </a:extLst>
+          </p:cNvPr>
+          <p:cNvSpPr txBox="1"/>
+          <p:nvPr/>
+        </p:nvSpPr>
+        <p:spPr>
+          <a:xfrm>
+            <a:off x="3747589" y="27188"/>
+            <a:ext cx="461986" cy="553998"/>
+          </a:xfrm>
+          <a:prstGeom prst="rect">
+            <a:avLst/>
+          </a:prstGeom>
+          <a:noFill/>
+        </p:spPr>
+        <p:txBody>
+          <a:bodyPr wrap="none" rtlCol="0">
+            <a:spAutoFit/>
+          </a:bodyPr>
+          <a:lstStyle/>
+          <a:p>
+            <a:r>
+              <a:rPr lang="en-US" sz="3000" b="1" dirty="0">
+                <a:latin typeface="Helvetica" pitchFamily="2" charset="0"/>
+              </a:rPr>
+              <a:t>B</a:t>
+            </a:r>
+          </a:p>
+        </p:txBody>
+      </p:sp>
     </p:spTree>
     <p:extLst>
       <p:ext uri="{BB962C8B-B14F-4D97-AF65-F5344CB8AC3E}">
@@ -5044,49 +5166,1085 @@
           <a:chExt cx="0" cy="0"/>
         </a:xfrm>
       </p:grpSpPr>
+      <p:sp>
+        <p:nvSpPr>
+          <p:cNvPr id="6" name="TextBox 5">
+            <a:extLst>
+              <a:ext uri="{FF2B5EF4-FFF2-40B4-BE49-F238E27FC236}">
+                <a16:creationId xmlns:a16="http://schemas.microsoft.com/office/drawing/2014/main" id="{B1FF236D-A308-1840-9D56-F83F304D33E3}"/>
+              </a:ext>
+            </a:extLst>
+          </p:cNvPr>
+          <p:cNvSpPr txBox="1"/>
+          <p:nvPr/>
+        </p:nvSpPr>
+        <p:spPr>
+          <a:xfrm>
+            <a:off x="9527488" y="5411993"/>
+            <a:ext cx="2664512" cy="400110"/>
+          </a:xfrm>
+          <a:prstGeom prst="rect">
+            <a:avLst/>
+          </a:prstGeom>
+          <a:noFill/>
+        </p:spPr>
+        <p:txBody>
+          <a:bodyPr wrap="none" rtlCol="0">
+            <a:spAutoFit/>
+          </a:bodyPr>
+          <a:lstStyle/>
+          <a:p>
+            <a:r>
+              <a:rPr lang="en-US" sz="2000" b="1" dirty="0">
+                <a:solidFill>
+                  <a:srgbClr val="FF6666"/>
+                </a:solidFill>
+                <a:highlight>
+                  <a:srgbClr val="FF6666"/>
+                </a:highlight>
+                <a:latin typeface="Helvetica" pitchFamily="2" charset="0"/>
+              </a:rPr>
+              <a:t>__</a:t>
+            </a:r>
+            <a:r>
+              <a:rPr lang="en-US" sz="2000" b="1" dirty="0">
+                <a:latin typeface="Helvetica" pitchFamily="2" charset="0"/>
+              </a:rPr>
+              <a:t> Sequencing error</a:t>
+            </a:r>
+          </a:p>
+        </p:txBody>
+      </p:sp>
+      <p:sp>
+        <p:nvSpPr>
+          <p:cNvPr id="7" name="TextBox 6">
+            <a:extLst>
+              <a:ext uri="{FF2B5EF4-FFF2-40B4-BE49-F238E27FC236}">
+                <a16:creationId xmlns:a16="http://schemas.microsoft.com/office/drawing/2014/main" id="{024A0B7E-2BAD-F745-A9A0-1A8EDEA11852}"/>
+              </a:ext>
+            </a:extLst>
+          </p:cNvPr>
+          <p:cNvSpPr txBox="1"/>
+          <p:nvPr/>
+        </p:nvSpPr>
+        <p:spPr>
+          <a:xfrm>
+            <a:off x="7643446" y="691031"/>
+            <a:ext cx="2751074" cy="461665"/>
+          </a:xfrm>
+          <a:prstGeom prst="rect">
+            <a:avLst/>
+          </a:prstGeom>
+          <a:noFill/>
+        </p:spPr>
+        <p:txBody>
+          <a:bodyPr wrap="none" rtlCol="0">
+            <a:spAutoFit/>
+          </a:bodyPr>
+          <a:lstStyle/>
+          <a:p>
+            <a:r>
+              <a:rPr lang="en-US" sz="2400" b="1" dirty="0">
+                <a:latin typeface="Helvetica" pitchFamily="2" charset="0"/>
+              </a:rPr>
+              <a:t>Before correction</a:t>
+            </a:r>
+          </a:p>
+        </p:txBody>
+      </p:sp>
+      <p:sp>
+        <p:nvSpPr>
+          <p:cNvPr id="8" name="TextBox 7">
+            <a:extLst>
+              <a:ext uri="{FF2B5EF4-FFF2-40B4-BE49-F238E27FC236}">
+                <a16:creationId xmlns:a16="http://schemas.microsoft.com/office/drawing/2014/main" id="{83E62D46-BBA8-2A4C-A227-27B99BA281AE}"/>
+              </a:ext>
+            </a:extLst>
+          </p:cNvPr>
+          <p:cNvSpPr txBox="1"/>
+          <p:nvPr/>
+        </p:nvSpPr>
+        <p:spPr>
+          <a:xfrm>
+            <a:off x="7779342" y="3038549"/>
+            <a:ext cx="2494594" cy="461665"/>
+          </a:xfrm>
+          <a:prstGeom prst="rect">
+            <a:avLst/>
+          </a:prstGeom>
+          <a:noFill/>
+        </p:spPr>
+        <p:txBody>
+          <a:bodyPr wrap="none" rtlCol="0">
+            <a:spAutoFit/>
+          </a:bodyPr>
+          <a:lstStyle/>
+          <a:p>
+            <a:r>
+              <a:rPr lang="en-US" sz="2400" b="1" dirty="0">
+                <a:latin typeface="Helvetica" pitchFamily="2" charset="0"/>
+              </a:rPr>
+              <a:t>After correction</a:t>
+            </a:r>
+          </a:p>
+        </p:txBody>
+      </p:sp>
+      <p:sp>
+        <p:nvSpPr>
+          <p:cNvPr id="9" name="TextBox 8">
+            <a:extLst>
+              <a:ext uri="{FF2B5EF4-FFF2-40B4-BE49-F238E27FC236}">
+                <a16:creationId xmlns:a16="http://schemas.microsoft.com/office/drawing/2014/main" id="{AE75FDCF-A383-BB49-A32B-20D41CF91093}"/>
+              </a:ext>
+            </a:extLst>
+          </p:cNvPr>
+          <p:cNvSpPr txBox="1"/>
+          <p:nvPr/>
+        </p:nvSpPr>
+        <p:spPr>
+          <a:xfrm>
+            <a:off x="8305288" y="5763256"/>
+            <a:ext cx="3937296" cy="400110"/>
+          </a:xfrm>
+          <a:prstGeom prst="rect">
+            <a:avLst/>
+          </a:prstGeom>
+          <a:noFill/>
+        </p:spPr>
+        <p:txBody>
+          <a:bodyPr wrap="none" rtlCol="0">
+            <a:spAutoFit/>
+          </a:bodyPr>
+          <a:lstStyle/>
+          <a:p>
+            <a:r>
+              <a:rPr lang="en-US" sz="2000" b="1" dirty="0">
+                <a:latin typeface="Helvetica" pitchFamily="2" charset="0"/>
+              </a:rPr>
+              <a:t>N=predicted as error by </a:t>
+            </a:r>
+            <a:r>
+              <a:rPr lang="en-US" sz="2000" b="1" dirty="0" err="1">
+                <a:latin typeface="Helvetica" pitchFamily="2" charset="0"/>
+              </a:rPr>
+              <a:t>ErrorX</a:t>
+            </a:r>
+            <a:endParaRPr lang="en-US" sz="2000" b="1" dirty="0">
+              <a:latin typeface="Helvetica" pitchFamily="2" charset="0"/>
+            </a:endParaRPr>
+          </a:p>
+        </p:txBody>
+      </p:sp>
       <p:pic>
         <p:nvPicPr>
-          <p:cNvPr id="5" name="Content Placeholder 4">
-            <a:extLst>
-              <a:ext uri="{FF2B5EF4-FFF2-40B4-BE49-F238E27FC236}">
-                <a16:creationId xmlns:a16="http://schemas.microsoft.com/office/drawing/2014/main" id="{FD7AF0A6-6E84-0E48-B640-B03E9D6216E8}"/>
+          <p:cNvPr id="2" name="Picture 1">
+            <a:extLst>
+              <a:ext uri="{FF2B5EF4-FFF2-40B4-BE49-F238E27FC236}">
+                <a16:creationId xmlns:a16="http://schemas.microsoft.com/office/drawing/2014/main" id="{345BC5AC-67D0-514C-AEF0-128C69164603}"/>
               </a:ext>
             </a:extLst>
           </p:cNvPr>
           <p:cNvPicPr>
-            <a:picLocks noGrp="1" noChangeAspect="1"/>
+            <a:picLocks noChangeAspect="1"/>
           </p:cNvPicPr>
-          <p:nvPr>
-            <p:ph idx="1"/>
-          </p:nvPr>
+          <p:nvPr/>
         </p:nvPicPr>
-        <p:blipFill rotWithShape="1">
-          <a:blip r:embed="rId2">
-            <a:clrChange>
-              <a:clrFrom>
-                <a:srgbClr val="FFFFFF"/>
-              </a:clrFrom>
-              <a:clrTo>
-                <a:srgbClr val="FFFFFF">
-                  <a:alpha val="0"/>
-                </a:srgbClr>
-              </a:clrTo>
-            </a:clrChange>
-          </a:blip>
-          <a:srcRect b="8341"/>
-          <a:stretch/>
+        <p:blipFill>
+          <a:blip r:embed="rId3"/>
+          <a:stretch>
+            <a:fillRect/>
+          </a:stretch>
         </p:blipFill>
         <p:spPr>
           <a:xfrm>
-            <a:off x="602077" y="1892606"/>
-            <a:ext cx="2603500" cy="2060416"/>
-          </a:xfrm>
+            <a:off x="5747024" y="3569706"/>
+            <a:ext cx="6248813" cy="1911149"/>
+          </a:xfrm>
+          <a:prstGeom prst="rect">
+            <a:avLst/>
+          </a:prstGeom>
         </p:spPr>
       </p:pic>
+      <p:pic>
+        <p:nvPicPr>
+          <p:cNvPr id="3" name="Picture 2">
+            <a:extLst>
+              <a:ext uri="{FF2B5EF4-FFF2-40B4-BE49-F238E27FC236}">
+                <a16:creationId xmlns:a16="http://schemas.microsoft.com/office/drawing/2014/main" id="{BA241381-27EE-6741-A175-7C6592DC8CA9}"/>
+              </a:ext>
+            </a:extLst>
+          </p:cNvPr>
+          <p:cNvPicPr>
+            <a:picLocks noChangeAspect="1"/>
+          </p:cNvPicPr>
+          <p:nvPr/>
+        </p:nvPicPr>
+        <p:blipFill>
+          <a:blip r:embed="rId4"/>
+          <a:stretch>
+            <a:fillRect/>
+          </a:stretch>
+        </p:blipFill>
+        <p:spPr>
+          <a:xfrm>
+            <a:off x="5725551" y="1180671"/>
+            <a:ext cx="6270286" cy="1900412"/>
+          </a:xfrm>
+          <a:prstGeom prst="rect">
+            <a:avLst/>
+          </a:prstGeom>
+        </p:spPr>
+      </p:pic>
+      <p:grpSp>
+        <p:nvGrpSpPr>
+          <p:cNvPr id="32" name="Group 31">
+            <a:extLst>
+              <a:ext uri="{FF2B5EF4-FFF2-40B4-BE49-F238E27FC236}">
+                <a16:creationId xmlns:a16="http://schemas.microsoft.com/office/drawing/2014/main" id="{93DEF03C-B5E5-284D-9FB4-D4852521FCCC}"/>
+              </a:ext>
+            </a:extLst>
+          </p:cNvPr>
+          <p:cNvGrpSpPr/>
+          <p:nvPr/>
+        </p:nvGrpSpPr>
+        <p:grpSpPr>
+          <a:xfrm>
+            <a:off x="1848232" y="4758030"/>
+            <a:ext cx="1863011" cy="618215"/>
+            <a:chOff x="6703678" y="4653045"/>
+            <a:chExt cx="1863011" cy="618215"/>
+          </a:xfrm>
+        </p:grpSpPr>
+        <p:sp>
+          <p:nvSpPr>
+            <p:cNvPr id="33" name="TextBox 32">
+              <a:extLst>
+                <a:ext uri="{FF2B5EF4-FFF2-40B4-BE49-F238E27FC236}">
+                  <a16:creationId xmlns:a16="http://schemas.microsoft.com/office/drawing/2014/main" id="{38871D37-30EE-774C-9AAF-999BDF638CC5}"/>
+                </a:ext>
+              </a:extLst>
+            </p:cNvPr>
+            <p:cNvSpPr txBox="1"/>
+            <p:nvPr/>
+          </p:nvSpPr>
+          <p:spPr>
+            <a:xfrm>
+              <a:off x="6703678" y="4809595"/>
+              <a:ext cx="1863011" cy="461665"/>
+            </a:xfrm>
+            <a:prstGeom prst="rect">
+              <a:avLst/>
+            </a:prstGeom>
+            <a:noFill/>
+          </p:spPr>
+          <p:txBody>
+            <a:bodyPr wrap="none" rtlCol="0">
+              <a:spAutoFit/>
+            </a:bodyPr>
+            <a:lstStyle/>
+            <a:p>
+              <a:r>
+                <a:rPr lang="en-US" sz="2400" b="1" dirty="0">
+                  <a:solidFill>
+                    <a:srgbClr val="1959F0"/>
+                  </a:solidFill>
+                  <a:latin typeface="Arial" panose="020B0604020202020204" pitchFamily="34" charset="0"/>
+                  <a:cs typeface="Arial" panose="020B0604020202020204" pitchFamily="34" charset="0"/>
+                </a:rPr>
+                <a:t>SEQ170844</a:t>
+              </a:r>
+            </a:p>
+          </p:txBody>
+        </p:sp>
+        <p:sp>
+          <p:nvSpPr>
+            <p:cNvPr id="34" name="Oval 33">
+              <a:extLst>
+                <a:ext uri="{FF2B5EF4-FFF2-40B4-BE49-F238E27FC236}">
+                  <a16:creationId xmlns:a16="http://schemas.microsoft.com/office/drawing/2014/main" id="{79F3CDEB-F4EC-B241-B49D-4E9A09C2DF8A}"/>
+                </a:ext>
+              </a:extLst>
+            </p:cNvPr>
+            <p:cNvSpPr/>
+            <p:nvPr/>
+          </p:nvSpPr>
+          <p:spPr>
+            <a:xfrm>
+              <a:off x="7384334" y="4653045"/>
+              <a:ext cx="100208" cy="100208"/>
+            </a:xfrm>
+            <a:prstGeom prst="ellipse">
+              <a:avLst/>
+            </a:prstGeom>
+            <a:solidFill>
+              <a:srgbClr val="1959F0"/>
+            </a:solidFill>
+          </p:spPr>
+          <p:style>
+            <a:lnRef idx="2">
+              <a:schemeClr val="dk1">
+                <a:shade val="50000"/>
+              </a:schemeClr>
+            </a:lnRef>
+            <a:fillRef idx="1">
+              <a:schemeClr val="dk1"/>
+            </a:fillRef>
+            <a:effectRef idx="0">
+              <a:schemeClr val="dk1"/>
+            </a:effectRef>
+            <a:fontRef idx="minor">
+              <a:schemeClr val="lt1"/>
+            </a:fontRef>
+          </p:style>
+          <p:txBody>
+            <a:bodyPr rtlCol="0" anchor="ctr"/>
+            <a:lstStyle/>
+            <a:p>
+              <a:pPr algn="ctr"/>
+              <a:endParaRPr lang="en-US" sz="2400">
+                <a:solidFill>
+                  <a:srgbClr val="1959F0"/>
+                </a:solidFill>
+              </a:endParaRPr>
+            </a:p>
+          </p:txBody>
+        </p:sp>
+      </p:grpSp>
+      <p:sp>
+        <p:nvSpPr>
+          <p:cNvPr id="35" name="TextBox 34">
+            <a:extLst>
+              <a:ext uri="{FF2B5EF4-FFF2-40B4-BE49-F238E27FC236}">
+                <a16:creationId xmlns:a16="http://schemas.microsoft.com/office/drawing/2014/main" id="{532663E8-A685-4B4F-930C-9DF5611D2B0E}"/>
+              </a:ext>
+            </a:extLst>
+          </p:cNvPr>
+          <p:cNvSpPr txBox="1"/>
+          <p:nvPr/>
+        </p:nvSpPr>
+        <p:spPr>
+          <a:xfrm>
+            <a:off x="1402585" y="45573"/>
+            <a:ext cx="3457679" cy="954107"/>
+          </a:xfrm>
+          <a:prstGeom prst="rect">
+            <a:avLst/>
+          </a:prstGeom>
+          <a:noFill/>
+        </p:spPr>
+        <p:txBody>
+          <a:bodyPr wrap="square" rtlCol="0">
+            <a:spAutoFit/>
+          </a:bodyPr>
+          <a:lstStyle/>
+          <a:p>
+            <a:pPr algn="ctr"/>
+            <a:r>
+              <a:rPr lang="en-US" sz="2800" dirty="0">
+                <a:latin typeface="Helvetica" pitchFamily="2" charset="0"/>
+              </a:rPr>
+              <a:t>False clonal variants from same template</a:t>
+            </a:r>
+          </a:p>
+        </p:txBody>
+      </p:sp>
+      <p:sp>
+        <p:nvSpPr>
+          <p:cNvPr id="36" name="TextBox 35">
+            <a:extLst>
+              <a:ext uri="{FF2B5EF4-FFF2-40B4-BE49-F238E27FC236}">
+                <a16:creationId xmlns:a16="http://schemas.microsoft.com/office/drawing/2014/main" id="{27829DC3-D064-F745-B632-948B317409EA}"/>
+              </a:ext>
+            </a:extLst>
+          </p:cNvPr>
+          <p:cNvSpPr txBox="1"/>
+          <p:nvPr/>
+        </p:nvSpPr>
+        <p:spPr>
+          <a:xfrm>
+            <a:off x="714803" y="5354674"/>
+            <a:ext cx="3907702" cy="954107"/>
+          </a:xfrm>
+          <a:prstGeom prst="rect">
+            <a:avLst/>
+          </a:prstGeom>
+          <a:noFill/>
+        </p:spPr>
+        <p:txBody>
+          <a:bodyPr wrap="square" rtlCol="0">
+            <a:spAutoFit/>
+          </a:bodyPr>
+          <a:lstStyle/>
+          <a:p>
+            <a:pPr algn="ctr"/>
+            <a:r>
+              <a:rPr lang="en-US" sz="2800" dirty="0" err="1">
+                <a:latin typeface="Helvetica" pitchFamily="2" charset="0"/>
+              </a:rPr>
+              <a:t>ErrorX</a:t>
+            </a:r>
+            <a:r>
+              <a:rPr lang="en-US" sz="2800" dirty="0">
+                <a:latin typeface="Helvetica" pitchFamily="2" charset="0"/>
+              </a:rPr>
+              <a:t> collapses into true sequence</a:t>
+            </a:r>
+          </a:p>
+        </p:txBody>
+      </p:sp>
+      <p:grpSp>
+        <p:nvGrpSpPr>
+          <p:cNvPr id="37" name="Group 36">
+            <a:extLst>
+              <a:ext uri="{FF2B5EF4-FFF2-40B4-BE49-F238E27FC236}">
+                <a16:creationId xmlns:a16="http://schemas.microsoft.com/office/drawing/2014/main" id="{982480A3-777E-D847-A855-760D743F8DF2}"/>
+              </a:ext>
+            </a:extLst>
+          </p:cNvPr>
+          <p:cNvGrpSpPr/>
+          <p:nvPr/>
+        </p:nvGrpSpPr>
+        <p:grpSpPr>
+          <a:xfrm>
+            <a:off x="182880" y="1051180"/>
+            <a:ext cx="4988296" cy="3109167"/>
+            <a:chOff x="-307696" y="1443190"/>
+            <a:chExt cx="6952697" cy="4333562"/>
+          </a:xfrm>
+        </p:grpSpPr>
+        <p:sp>
+          <p:nvSpPr>
+            <p:cNvPr id="38" name="TextBox 37">
+              <a:extLst>
+                <a:ext uri="{FF2B5EF4-FFF2-40B4-BE49-F238E27FC236}">
+                  <a16:creationId xmlns:a16="http://schemas.microsoft.com/office/drawing/2014/main" id="{52A5216D-93AC-6641-901E-58301998BBA1}"/>
+                </a:ext>
+              </a:extLst>
+            </p:cNvPr>
+            <p:cNvSpPr txBox="1"/>
+            <p:nvPr/>
+          </p:nvSpPr>
+          <p:spPr>
+            <a:xfrm>
+              <a:off x="251846" y="3217083"/>
+              <a:ext cx="1863012" cy="461665"/>
+            </a:xfrm>
+            <a:prstGeom prst="rect">
+              <a:avLst/>
+            </a:prstGeom>
+            <a:noFill/>
+          </p:spPr>
+          <p:txBody>
+            <a:bodyPr wrap="none" rtlCol="0">
+              <a:spAutoFit/>
+            </a:bodyPr>
+            <a:lstStyle/>
+            <a:p>
+              <a:r>
+                <a:rPr lang="en-US" sz="2400" b="1" dirty="0">
+                  <a:latin typeface="Arial" panose="020B0604020202020204" pitchFamily="34" charset="0"/>
+                  <a:cs typeface="Arial" panose="020B0604020202020204" pitchFamily="34" charset="0"/>
+                </a:rPr>
+                <a:t>SEQ170844</a:t>
+              </a:r>
+            </a:p>
+          </p:txBody>
+        </p:sp>
+        <p:sp>
+          <p:nvSpPr>
+            <p:cNvPr id="39" name="TextBox 38">
+              <a:extLst>
+                <a:ext uri="{FF2B5EF4-FFF2-40B4-BE49-F238E27FC236}">
+                  <a16:creationId xmlns:a16="http://schemas.microsoft.com/office/drawing/2014/main" id="{6E17A374-14CA-0B46-9A69-FE06DCCB4046}"/>
+                </a:ext>
+              </a:extLst>
+            </p:cNvPr>
+            <p:cNvSpPr txBox="1"/>
+            <p:nvPr/>
+          </p:nvSpPr>
+          <p:spPr>
+            <a:xfrm>
+              <a:off x="689431" y="1919873"/>
+              <a:ext cx="1691489" cy="461665"/>
+            </a:xfrm>
+            <a:prstGeom prst="rect">
+              <a:avLst/>
+            </a:prstGeom>
+            <a:noFill/>
+          </p:spPr>
+          <p:txBody>
+            <a:bodyPr wrap="none" rtlCol="0">
+              <a:spAutoFit/>
+            </a:bodyPr>
+            <a:lstStyle/>
+            <a:p>
+              <a:r>
+                <a:rPr lang="en-US" sz="2400" b="1" dirty="0">
+                  <a:latin typeface="Arial" panose="020B0604020202020204" pitchFamily="34" charset="0"/>
+                  <a:cs typeface="Arial" panose="020B0604020202020204" pitchFamily="34" charset="0"/>
+                </a:rPr>
+                <a:t>SEQ17575</a:t>
+              </a:r>
+            </a:p>
+          </p:txBody>
+        </p:sp>
+        <p:sp>
+          <p:nvSpPr>
+            <p:cNvPr id="40" name="TextBox 39">
+              <a:extLst>
+                <a:ext uri="{FF2B5EF4-FFF2-40B4-BE49-F238E27FC236}">
+                  <a16:creationId xmlns:a16="http://schemas.microsoft.com/office/drawing/2014/main" id="{71F2DFDF-A3E9-E64D-B460-4D0C6F89F0BB}"/>
+                </a:ext>
+              </a:extLst>
+            </p:cNvPr>
+            <p:cNvSpPr txBox="1"/>
+            <p:nvPr/>
+          </p:nvSpPr>
+          <p:spPr>
+            <a:xfrm>
+              <a:off x="-307696" y="4441857"/>
+              <a:ext cx="1863012" cy="461665"/>
+            </a:xfrm>
+            <a:prstGeom prst="rect">
+              <a:avLst/>
+            </a:prstGeom>
+            <a:noFill/>
+          </p:spPr>
+          <p:txBody>
+            <a:bodyPr wrap="none" rtlCol="0">
+              <a:spAutoFit/>
+            </a:bodyPr>
+            <a:lstStyle/>
+            <a:p>
+              <a:r>
+                <a:rPr lang="en-US" sz="2400" b="1" dirty="0">
+                  <a:latin typeface="Arial" panose="020B0604020202020204" pitchFamily="34" charset="0"/>
+                  <a:cs typeface="Arial" panose="020B0604020202020204" pitchFamily="34" charset="0"/>
+                </a:rPr>
+                <a:t>SEQ525409</a:t>
+              </a:r>
+            </a:p>
+          </p:txBody>
+        </p:sp>
+        <p:sp>
+          <p:nvSpPr>
+            <p:cNvPr id="41" name="TextBox 40">
+              <a:extLst>
+                <a:ext uri="{FF2B5EF4-FFF2-40B4-BE49-F238E27FC236}">
+                  <a16:creationId xmlns:a16="http://schemas.microsoft.com/office/drawing/2014/main" id="{67735A2B-581B-B74C-95EA-245AC742B785}"/>
+                </a:ext>
+              </a:extLst>
+            </p:cNvPr>
+            <p:cNvSpPr txBox="1"/>
+            <p:nvPr/>
+          </p:nvSpPr>
+          <p:spPr>
+            <a:xfrm>
+              <a:off x="772480" y="5315087"/>
+              <a:ext cx="1863012" cy="461665"/>
+            </a:xfrm>
+            <a:prstGeom prst="rect">
+              <a:avLst/>
+            </a:prstGeom>
+            <a:noFill/>
+          </p:spPr>
+          <p:txBody>
+            <a:bodyPr wrap="none" rtlCol="0">
+              <a:spAutoFit/>
+            </a:bodyPr>
+            <a:lstStyle/>
+            <a:p>
+              <a:r>
+                <a:rPr lang="en-US" sz="2400" b="1" dirty="0">
+                  <a:latin typeface="Arial" panose="020B0604020202020204" pitchFamily="34" charset="0"/>
+                  <a:cs typeface="Arial" panose="020B0604020202020204" pitchFamily="34" charset="0"/>
+                </a:rPr>
+                <a:t>SEQ920175</a:t>
+              </a:r>
+            </a:p>
+          </p:txBody>
+        </p:sp>
+        <p:sp>
+          <p:nvSpPr>
+            <p:cNvPr id="42" name="TextBox 41">
+              <a:extLst>
+                <a:ext uri="{FF2B5EF4-FFF2-40B4-BE49-F238E27FC236}">
+                  <a16:creationId xmlns:a16="http://schemas.microsoft.com/office/drawing/2014/main" id="{E2D8C685-82B0-644E-A15A-F0F130972788}"/>
+                </a:ext>
+              </a:extLst>
+            </p:cNvPr>
+            <p:cNvSpPr txBox="1"/>
+            <p:nvPr/>
+          </p:nvSpPr>
+          <p:spPr>
+            <a:xfrm>
+              <a:off x="3552494" y="5278309"/>
+              <a:ext cx="1863011" cy="461665"/>
+            </a:xfrm>
+            <a:prstGeom prst="rect">
+              <a:avLst/>
+            </a:prstGeom>
+            <a:noFill/>
+          </p:spPr>
+          <p:txBody>
+            <a:bodyPr wrap="none" rtlCol="0">
+              <a:spAutoFit/>
+            </a:bodyPr>
+            <a:lstStyle/>
+            <a:p>
+              <a:r>
+                <a:rPr lang="en-US" sz="2400" b="1" dirty="0">
+                  <a:latin typeface="Arial" panose="020B0604020202020204" pitchFamily="34" charset="0"/>
+                  <a:cs typeface="Arial" panose="020B0604020202020204" pitchFamily="34" charset="0"/>
+                </a:rPr>
+                <a:t>SEQ234967</a:t>
+              </a:r>
+            </a:p>
+          </p:txBody>
+        </p:sp>
+        <p:sp>
+          <p:nvSpPr>
+            <p:cNvPr id="43" name="TextBox 42">
+              <a:extLst>
+                <a:ext uri="{FF2B5EF4-FFF2-40B4-BE49-F238E27FC236}">
+                  <a16:creationId xmlns:a16="http://schemas.microsoft.com/office/drawing/2014/main" id="{5C418F8C-1098-4B41-8CBE-4ACB74F3BB18}"/>
+                </a:ext>
+              </a:extLst>
+            </p:cNvPr>
+            <p:cNvSpPr txBox="1"/>
+            <p:nvPr/>
+          </p:nvSpPr>
+          <p:spPr>
+            <a:xfrm>
+              <a:off x="4756500" y="4295799"/>
+              <a:ext cx="1846018" cy="461665"/>
+            </a:xfrm>
+            <a:prstGeom prst="rect">
+              <a:avLst/>
+            </a:prstGeom>
+            <a:noFill/>
+          </p:spPr>
+          <p:txBody>
+            <a:bodyPr wrap="none" rtlCol="0">
+              <a:spAutoFit/>
+            </a:bodyPr>
+            <a:lstStyle/>
+            <a:p>
+              <a:r>
+                <a:rPr lang="en-US" sz="2400" b="1" dirty="0">
+                  <a:latin typeface="Arial" panose="020B0604020202020204" pitchFamily="34" charset="0"/>
+                  <a:cs typeface="Arial" panose="020B0604020202020204" pitchFamily="34" charset="0"/>
+                </a:rPr>
+                <a:t>SEQ101101</a:t>
+              </a:r>
+            </a:p>
+          </p:txBody>
+        </p:sp>
+        <p:sp>
+          <p:nvSpPr>
+            <p:cNvPr id="44" name="TextBox 43">
+              <a:extLst>
+                <a:ext uri="{FF2B5EF4-FFF2-40B4-BE49-F238E27FC236}">
+                  <a16:creationId xmlns:a16="http://schemas.microsoft.com/office/drawing/2014/main" id="{58BC4EA6-5068-0840-865C-F58B9DA461D6}"/>
+                </a:ext>
+              </a:extLst>
+            </p:cNvPr>
+            <p:cNvSpPr txBox="1"/>
+            <p:nvPr/>
+          </p:nvSpPr>
+          <p:spPr>
+            <a:xfrm>
+              <a:off x="4781990" y="2742335"/>
+              <a:ext cx="1863011" cy="461665"/>
+            </a:xfrm>
+            <a:prstGeom prst="rect">
+              <a:avLst/>
+            </a:prstGeom>
+            <a:noFill/>
+          </p:spPr>
+          <p:txBody>
+            <a:bodyPr wrap="none" rtlCol="0">
+              <a:spAutoFit/>
+            </a:bodyPr>
+            <a:lstStyle/>
+            <a:p>
+              <a:r>
+                <a:rPr lang="en-US" sz="2400" b="1" dirty="0">
+                  <a:latin typeface="Arial" panose="020B0604020202020204" pitchFamily="34" charset="0"/>
+                  <a:cs typeface="Arial" panose="020B0604020202020204" pitchFamily="34" charset="0"/>
+                </a:rPr>
+                <a:t>SEQ979990</a:t>
+              </a:r>
+            </a:p>
+          </p:txBody>
+        </p:sp>
+        <p:sp>
+          <p:nvSpPr>
+            <p:cNvPr id="45" name="TextBox 44">
+              <a:extLst>
+                <a:ext uri="{FF2B5EF4-FFF2-40B4-BE49-F238E27FC236}">
+                  <a16:creationId xmlns:a16="http://schemas.microsoft.com/office/drawing/2014/main" id="{2BF66C28-C1B6-8A46-99A6-F42F9726A669}"/>
+                </a:ext>
+              </a:extLst>
+            </p:cNvPr>
+            <p:cNvSpPr txBox="1"/>
+            <p:nvPr/>
+          </p:nvSpPr>
+          <p:spPr>
+            <a:xfrm>
+              <a:off x="3764400" y="1443190"/>
+              <a:ext cx="1691489" cy="461665"/>
+            </a:xfrm>
+            <a:prstGeom prst="rect">
+              <a:avLst/>
+            </a:prstGeom>
+            <a:noFill/>
+          </p:spPr>
+          <p:txBody>
+            <a:bodyPr wrap="none" rtlCol="0">
+              <a:spAutoFit/>
+            </a:bodyPr>
+            <a:lstStyle/>
+            <a:p>
+              <a:r>
+                <a:rPr lang="en-US" sz="2400" b="1" dirty="0">
+                  <a:latin typeface="Arial" panose="020B0604020202020204" pitchFamily="34" charset="0"/>
+                  <a:cs typeface="Arial" panose="020B0604020202020204" pitchFamily="34" charset="0"/>
+                </a:rPr>
+                <a:t>SEQ93940</a:t>
+              </a:r>
+            </a:p>
+          </p:txBody>
+        </p:sp>
+        <p:sp>
+          <p:nvSpPr>
+            <p:cNvPr id="46" name="Oval 45">
+              <a:extLst>
+                <a:ext uri="{FF2B5EF4-FFF2-40B4-BE49-F238E27FC236}">
+                  <a16:creationId xmlns:a16="http://schemas.microsoft.com/office/drawing/2014/main" id="{FFD7E210-5DEA-4049-A949-241475EC6553}"/>
+                </a:ext>
+              </a:extLst>
+            </p:cNvPr>
+            <p:cNvSpPr/>
+            <p:nvPr/>
+          </p:nvSpPr>
+          <p:spPr>
+            <a:xfrm>
+              <a:off x="2939695" y="3463697"/>
+              <a:ext cx="100208" cy="100208"/>
+            </a:xfrm>
+            <a:prstGeom prst="ellipse">
+              <a:avLst/>
+            </a:prstGeom>
+          </p:spPr>
+          <p:style>
+            <a:lnRef idx="2">
+              <a:schemeClr val="dk1">
+                <a:shade val="50000"/>
+              </a:schemeClr>
+            </a:lnRef>
+            <a:fillRef idx="1">
+              <a:schemeClr val="dk1"/>
+            </a:fillRef>
+            <a:effectRef idx="0">
+              <a:schemeClr val="dk1"/>
+            </a:effectRef>
+            <a:fontRef idx="minor">
+              <a:schemeClr val="lt1"/>
+            </a:fontRef>
+          </p:style>
+          <p:txBody>
+            <a:bodyPr rtlCol="0" anchor="ctr"/>
+            <a:lstStyle/>
+            <a:p>
+              <a:pPr algn="ctr"/>
+              <a:endParaRPr lang="en-US" sz="2400">
+                <a:solidFill>
+                  <a:sysClr val="windowText" lastClr="000000"/>
+                </a:solidFill>
+              </a:endParaRPr>
+            </a:p>
+          </p:txBody>
+        </p:sp>
+        <p:cxnSp>
+          <p:nvCxnSpPr>
+            <p:cNvPr id="47" name="Straight Connector 46">
+              <a:extLst>
+                <a:ext uri="{FF2B5EF4-FFF2-40B4-BE49-F238E27FC236}">
+                  <a16:creationId xmlns:a16="http://schemas.microsoft.com/office/drawing/2014/main" id="{8C012DDB-B978-0245-AA2E-16591CA068B3}"/>
+                </a:ext>
+              </a:extLst>
+            </p:cNvPr>
+            <p:cNvCxnSpPr>
+              <a:cxnSpLocks/>
+            </p:cNvCxnSpPr>
+            <p:nvPr/>
+          </p:nvCxnSpPr>
+          <p:spPr>
+            <a:xfrm>
+              <a:off x="1450630" y="2481216"/>
+              <a:ext cx="1516266" cy="1030436"/>
+            </a:xfrm>
+            <a:prstGeom prst="line">
+              <a:avLst/>
+            </a:prstGeom>
+            <a:ln w="28575"/>
+          </p:spPr>
+          <p:style>
+            <a:lnRef idx="1">
+              <a:schemeClr val="dk1"/>
+            </a:lnRef>
+            <a:fillRef idx="0">
+              <a:schemeClr val="dk1"/>
+            </a:fillRef>
+            <a:effectRef idx="0">
+              <a:schemeClr val="dk1"/>
+            </a:effectRef>
+            <a:fontRef idx="minor">
+              <a:schemeClr val="tx1"/>
+            </a:fontRef>
+          </p:style>
+        </p:cxnSp>
+        <p:cxnSp>
+          <p:nvCxnSpPr>
+            <p:cNvPr id="48" name="Straight Connector 47">
+              <a:extLst>
+                <a:ext uri="{FF2B5EF4-FFF2-40B4-BE49-F238E27FC236}">
+                  <a16:creationId xmlns:a16="http://schemas.microsoft.com/office/drawing/2014/main" id="{D01BA872-20C1-C14E-846B-9B541EDF7407}"/>
+                </a:ext>
+              </a:extLst>
+            </p:cNvPr>
+            <p:cNvCxnSpPr>
+              <a:cxnSpLocks/>
+            </p:cNvCxnSpPr>
+            <p:nvPr/>
+          </p:nvCxnSpPr>
+          <p:spPr>
+            <a:xfrm flipV="1">
+              <a:off x="2994272" y="1904855"/>
+              <a:ext cx="833911" cy="1612424"/>
+            </a:xfrm>
+            <a:prstGeom prst="line">
+              <a:avLst/>
+            </a:prstGeom>
+            <a:ln w="28575"/>
+          </p:spPr>
+          <p:style>
+            <a:lnRef idx="1">
+              <a:schemeClr val="dk1"/>
+            </a:lnRef>
+            <a:fillRef idx="0">
+              <a:schemeClr val="dk1"/>
+            </a:fillRef>
+            <a:effectRef idx="0">
+              <a:schemeClr val="dk1"/>
+            </a:effectRef>
+            <a:fontRef idx="minor">
+              <a:schemeClr val="tx1"/>
+            </a:fontRef>
+          </p:style>
+        </p:cxnSp>
+        <p:cxnSp>
+          <p:nvCxnSpPr>
+            <p:cNvPr id="49" name="Straight Connector 48">
+              <a:extLst>
+                <a:ext uri="{FF2B5EF4-FFF2-40B4-BE49-F238E27FC236}">
+                  <a16:creationId xmlns:a16="http://schemas.microsoft.com/office/drawing/2014/main" id="{BEF54753-C594-7048-A4EA-96F6DC268006}"/>
+                </a:ext>
+              </a:extLst>
+            </p:cNvPr>
+            <p:cNvCxnSpPr>
+              <a:cxnSpLocks/>
+              <a:endCxn id="44" idx="1"/>
+            </p:cNvCxnSpPr>
+            <p:nvPr/>
+          </p:nvCxnSpPr>
+          <p:spPr>
+            <a:xfrm flipV="1">
+              <a:off x="2966896" y="2973168"/>
+              <a:ext cx="1815094" cy="549500"/>
+            </a:xfrm>
+            <a:prstGeom prst="line">
+              <a:avLst/>
+            </a:prstGeom>
+            <a:ln w="28575"/>
+          </p:spPr>
+          <p:style>
+            <a:lnRef idx="1">
+              <a:schemeClr val="dk1"/>
+            </a:lnRef>
+            <a:fillRef idx="0">
+              <a:schemeClr val="dk1"/>
+            </a:fillRef>
+            <a:effectRef idx="0">
+              <a:schemeClr val="dk1"/>
+            </a:effectRef>
+            <a:fontRef idx="minor">
+              <a:schemeClr val="tx1"/>
+            </a:fontRef>
+          </p:style>
+        </p:cxnSp>
+        <p:cxnSp>
+          <p:nvCxnSpPr>
+            <p:cNvPr id="50" name="Straight Connector 49">
+              <a:extLst>
+                <a:ext uri="{FF2B5EF4-FFF2-40B4-BE49-F238E27FC236}">
+                  <a16:creationId xmlns:a16="http://schemas.microsoft.com/office/drawing/2014/main" id="{9A2E101B-7EC1-2343-88C9-FD7CB14580B7}"/>
+                </a:ext>
+              </a:extLst>
+            </p:cNvPr>
+            <p:cNvCxnSpPr>
+              <a:cxnSpLocks/>
+            </p:cNvCxnSpPr>
+            <p:nvPr/>
+          </p:nvCxnSpPr>
+          <p:spPr>
+            <a:xfrm>
+              <a:off x="2994859" y="3525300"/>
+              <a:ext cx="1761641" cy="966362"/>
+            </a:xfrm>
+            <a:prstGeom prst="line">
+              <a:avLst/>
+            </a:prstGeom>
+            <a:ln w="28575"/>
+          </p:spPr>
+          <p:style>
+            <a:lnRef idx="1">
+              <a:schemeClr val="dk1"/>
+            </a:lnRef>
+            <a:fillRef idx="0">
+              <a:schemeClr val="dk1"/>
+            </a:fillRef>
+            <a:effectRef idx="0">
+              <a:schemeClr val="dk1"/>
+            </a:effectRef>
+            <a:fontRef idx="minor">
+              <a:schemeClr val="tx1"/>
+            </a:fontRef>
+          </p:style>
+        </p:cxnSp>
+        <p:cxnSp>
+          <p:nvCxnSpPr>
+            <p:cNvPr id="51" name="Straight Connector 50">
+              <a:extLst>
+                <a:ext uri="{FF2B5EF4-FFF2-40B4-BE49-F238E27FC236}">
+                  <a16:creationId xmlns:a16="http://schemas.microsoft.com/office/drawing/2014/main" id="{7F7F4FD9-B79C-BA46-9BAC-C02F6CB2977E}"/>
+                </a:ext>
+              </a:extLst>
+            </p:cNvPr>
+            <p:cNvCxnSpPr>
+              <a:cxnSpLocks/>
+            </p:cNvCxnSpPr>
+            <p:nvPr/>
+          </p:nvCxnSpPr>
+          <p:spPr>
+            <a:xfrm>
+              <a:off x="3002117" y="3539216"/>
+              <a:ext cx="758133" cy="1805070"/>
+            </a:xfrm>
+            <a:prstGeom prst="line">
+              <a:avLst/>
+            </a:prstGeom>
+            <a:ln w="28575"/>
+          </p:spPr>
+          <p:style>
+            <a:lnRef idx="1">
+              <a:schemeClr val="dk1"/>
+            </a:lnRef>
+            <a:fillRef idx="0">
+              <a:schemeClr val="dk1"/>
+            </a:fillRef>
+            <a:effectRef idx="0">
+              <a:schemeClr val="dk1"/>
+            </a:effectRef>
+            <a:fontRef idx="minor">
+              <a:schemeClr val="tx1"/>
+            </a:fontRef>
+          </p:style>
+        </p:cxnSp>
+        <p:cxnSp>
+          <p:nvCxnSpPr>
+            <p:cNvPr id="52" name="Straight Connector 51">
+              <a:extLst>
+                <a:ext uri="{FF2B5EF4-FFF2-40B4-BE49-F238E27FC236}">
+                  <a16:creationId xmlns:a16="http://schemas.microsoft.com/office/drawing/2014/main" id="{BFF49BD8-DE74-AA4A-B84D-FA5D2095EB83}"/>
+                </a:ext>
+              </a:extLst>
+            </p:cNvPr>
+            <p:cNvCxnSpPr>
+              <a:cxnSpLocks/>
+            </p:cNvCxnSpPr>
+            <p:nvPr/>
+          </p:nvCxnSpPr>
+          <p:spPr>
+            <a:xfrm flipH="1">
+              <a:off x="2294515" y="3507957"/>
+              <a:ext cx="696348" cy="1836329"/>
+            </a:xfrm>
+            <a:prstGeom prst="line">
+              <a:avLst/>
+            </a:prstGeom>
+            <a:ln w="28575"/>
+          </p:spPr>
+          <p:style>
+            <a:lnRef idx="1">
+              <a:schemeClr val="dk1"/>
+            </a:lnRef>
+            <a:fillRef idx="0">
+              <a:schemeClr val="dk1"/>
+            </a:fillRef>
+            <a:effectRef idx="0">
+              <a:schemeClr val="dk1"/>
+            </a:effectRef>
+            <a:fontRef idx="minor">
+              <a:schemeClr val="tx1"/>
+            </a:fontRef>
+          </p:style>
+        </p:cxnSp>
+        <p:cxnSp>
+          <p:nvCxnSpPr>
+            <p:cNvPr id="53" name="Straight Connector 52">
+              <a:extLst>
+                <a:ext uri="{FF2B5EF4-FFF2-40B4-BE49-F238E27FC236}">
+                  <a16:creationId xmlns:a16="http://schemas.microsoft.com/office/drawing/2014/main" id="{9A486701-8AB3-8940-ABDF-C180B18C2327}"/>
+                </a:ext>
+              </a:extLst>
+            </p:cNvPr>
+            <p:cNvCxnSpPr>
+              <a:cxnSpLocks/>
+            </p:cNvCxnSpPr>
+            <p:nvPr/>
+          </p:nvCxnSpPr>
+          <p:spPr>
+            <a:xfrm flipH="1">
+              <a:off x="1298265" y="3523092"/>
+              <a:ext cx="1668631" cy="891534"/>
+            </a:xfrm>
+            <a:prstGeom prst="line">
+              <a:avLst/>
+            </a:prstGeom>
+            <a:ln w="28575"/>
+          </p:spPr>
+          <p:style>
+            <a:lnRef idx="1">
+              <a:schemeClr val="dk1"/>
+            </a:lnRef>
+            <a:fillRef idx="0">
+              <a:schemeClr val="dk1"/>
+            </a:fillRef>
+            <a:effectRef idx="0">
+              <a:schemeClr val="dk1"/>
+            </a:effectRef>
+            <a:fontRef idx="minor">
+              <a:schemeClr val="tx1"/>
+            </a:fontRef>
+          </p:style>
+        </p:cxnSp>
+      </p:grpSp>
     </p:spTree>
     <p:extLst>
       <p:ext uri="{BB962C8B-B14F-4D97-AF65-F5344CB8AC3E}">
-        <p14:creationId xmlns:p14="http://schemas.microsoft.com/office/powerpoint/2010/main" val="1113475261"/>
+        <p14:creationId xmlns:p14="http://schemas.microsoft.com/office/powerpoint/2010/main" val="2564364659"/>
       </p:ext>
     </p:extLst>
   </p:cSld>
@@ -5115,6 +6273,75 @@
       </p:grpSpPr>
       <p:pic>
         <p:nvPicPr>
+          <p:cNvPr id="5" name="Content Placeholder 4">
+            <a:extLst>
+              <a:ext uri="{FF2B5EF4-FFF2-40B4-BE49-F238E27FC236}">
+                <a16:creationId xmlns:a16="http://schemas.microsoft.com/office/drawing/2014/main" id="{FD7AF0A6-6E84-0E48-B640-B03E9D6216E8}"/>
+              </a:ext>
+            </a:extLst>
+          </p:cNvPr>
+          <p:cNvPicPr>
+            <a:picLocks noGrp="1" noChangeAspect="1"/>
+          </p:cNvPicPr>
+          <p:nvPr>
+            <p:ph idx="1"/>
+          </p:nvPr>
+        </p:nvPicPr>
+        <p:blipFill rotWithShape="1">
+          <a:blip r:embed="rId2">
+            <a:clrChange>
+              <a:clrFrom>
+                <a:srgbClr val="FFFFFF"/>
+              </a:clrFrom>
+              <a:clrTo>
+                <a:srgbClr val="FFFFFF">
+                  <a:alpha val="0"/>
+                </a:srgbClr>
+              </a:clrTo>
+            </a:clrChange>
+          </a:blip>
+          <a:srcRect b="8341"/>
+          <a:stretch/>
+        </p:blipFill>
+        <p:spPr>
+          <a:xfrm>
+            <a:off x="602077" y="1892606"/>
+            <a:ext cx="2603500" cy="2060416"/>
+          </a:xfrm>
+        </p:spPr>
+      </p:pic>
+    </p:spTree>
+    <p:extLst>
+      <p:ext uri="{BB962C8B-B14F-4D97-AF65-F5344CB8AC3E}">
+        <p14:creationId xmlns:p14="http://schemas.microsoft.com/office/powerpoint/2010/main" val="1113475261"/>
+      </p:ext>
+    </p:extLst>
+  </p:cSld>
+  <p:clrMapOvr>
+    <a:masterClrMapping/>
+  </p:clrMapOvr>
+</p:sld>
+</file>
+
+<file path=ppt/slides/slide14.xml><?xml version="1.0" encoding="utf-8"?>
+<p:sld xmlns:a="http://schemas.openxmlformats.org/drawingml/2006/main" xmlns:r="http://schemas.openxmlformats.org/officeDocument/2006/relationships" xmlns:p="http://schemas.openxmlformats.org/presentationml/2006/main">
+  <p:cSld>
+    <p:spTree>
+      <p:nvGrpSpPr>
+        <p:cNvPr id="1" name=""/>
+        <p:cNvGrpSpPr/>
+        <p:nvPr/>
+      </p:nvGrpSpPr>
+      <p:grpSpPr>
+        <a:xfrm>
+          <a:off x="0" y="0"/>
+          <a:ext cx="0" cy="0"/>
+          <a:chOff x="0" y="0"/>
+          <a:chExt cx="0" cy="0"/>
+        </a:xfrm>
+      </p:grpSpPr>
+      <p:pic>
+        <p:nvPicPr>
           <p:cNvPr id="4" name="Picture 3">
             <a:extLst>
               <a:ext uri="{FF2B5EF4-FFF2-40B4-BE49-F238E27FC236}">
@@ -5166,7 +6393,7 @@
 </p:sld>
 </file>
 
-<file path=ppt/slides/slide14.xml><?xml version="1.0" encoding="utf-8"?>
+<file path=ppt/slides/slide15.xml><?xml version="1.0" encoding="utf-8"?>
 <p:sld xmlns:a="http://schemas.openxmlformats.org/drawingml/2006/main" xmlns:r="http://schemas.openxmlformats.org/officeDocument/2006/relationships" xmlns:p="http://schemas.openxmlformats.org/presentationml/2006/main">
   <p:cSld>
     <p:spTree>
@@ -9358,6 +10585,43 @@
           </p:style>
         </p:cxnSp>
       </p:grpSp>
+      <p:sp>
+        <p:nvSpPr>
+          <p:cNvPr id="2" name="TextBox 1">
+            <a:extLst>
+              <a:ext uri="{FF2B5EF4-FFF2-40B4-BE49-F238E27FC236}">
+                <a16:creationId xmlns:a16="http://schemas.microsoft.com/office/drawing/2014/main" id="{0240DCCA-DE6A-454A-9FF6-2413C9915EA7}"/>
+              </a:ext>
+            </a:extLst>
+          </p:cNvPr>
+          <p:cNvSpPr txBox="1"/>
+          <p:nvPr/>
+        </p:nvSpPr>
+        <p:spPr>
+          <a:xfrm>
+            <a:off x="689520" y="402526"/>
+            <a:ext cx="461986" cy="553998"/>
+          </a:xfrm>
+          <a:prstGeom prst="rect">
+            <a:avLst/>
+          </a:prstGeom>
+          <a:noFill/>
+        </p:spPr>
+        <p:txBody>
+          <a:bodyPr wrap="none" rtlCol="0">
+            <a:spAutoFit/>
+          </a:bodyPr>
+          <a:lstStyle/>
+          <a:p>
+            <a:r>
+              <a:rPr lang="en-US" sz="3000" b="1" dirty="0">
+                <a:latin typeface="Helvetica" pitchFamily="2" charset="0"/>
+              </a:rPr>
+              <a:t>A</a:t>
+            </a:r>
+          </a:p>
+        </p:txBody>
+      </p:sp>
     </p:spTree>
     <p:extLst>
       <p:ext uri="{BB962C8B-B14F-4D97-AF65-F5344CB8AC3E}">

</xml_diff>